<commit_message>
Minor changes to walk-through bullets
</commit_message>
<xml_diff>
--- a/Summary bullets.pptx
+++ b/Summary bullets.pptx
@@ -5,14 +5,13 @@
     <p:sldMasterId id="2147483648" r:id="rId1"/>
   </p:sldMasterIdLst>
   <p:notesMasterIdLst>
-    <p:notesMasterId r:id="rId7"/>
+    <p:notesMasterId r:id="rId6"/>
   </p:notesMasterIdLst>
   <p:sldIdLst>
     <p:sldId id="256" r:id="rId2"/>
-    <p:sldId id="263" r:id="rId3"/>
-    <p:sldId id="260" r:id="rId4"/>
-    <p:sldId id="261" r:id="rId5"/>
-    <p:sldId id="262" r:id="rId6"/>
+    <p:sldId id="260" r:id="rId3"/>
+    <p:sldId id="261" r:id="rId4"/>
+    <p:sldId id="262" r:id="rId5"/>
   </p:sldIdLst>
   <p:sldSz cx="12192000" cy="6858000"/>
   <p:notesSz cx="6858000" cy="9144000"/>
@@ -3976,8 +3975,8 @@
         </p:nvSpPr>
         <p:spPr>
           <a:xfrm>
-            <a:off x="892712" y="1013115"/>
-            <a:ext cx="1426929" cy="477054"/>
+            <a:off x="904447" y="1120837"/>
+            <a:ext cx="2489464" cy="369332"/>
           </a:xfrm>
           <a:prstGeom prst="rect">
             <a:avLst/>
@@ -3990,23 +3989,61 @@
           </a:bodyPr>
           <a:lstStyle/>
           <a:p>
+            <a:r>
+              <a:rPr lang="en-US" dirty="0"/>
+              <a:t>What does Sparrow do? </a:t>
+            </a:r>
+          </a:p>
+        </p:txBody>
+      </p:sp>
+      <p:sp>
+        <p:nvSpPr>
+          <p:cNvPr id="10" name="TextBox 9">
+            <a:extLst>
+              <a:ext uri="{FF2B5EF4-FFF2-40B4-BE49-F238E27FC236}">
+                <a16:creationId xmlns:a16="http://schemas.microsoft.com/office/drawing/2014/main" id="{02047DF3-0242-CE4D-A7F8-B2C12963E959}"/>
+              </a:ext>
+            </a:extLst>
+          </p:cNvPr>
+          <p:cNvSpPr txBox="1"/>
+          <p:nvPr/>
+        </p:nvSpPr>
+        <p:spPr>
+          <a:xfrm>
+            <a:off x="1313750" y="1632075"/>
+            <a:ext cx="9564499" cy="861774"/>
+          </a:xfrm>
+          <a:prstGeom prst="rect">
+            <a:avLst/>
+          </a:prstGeom>
+          <a:noFill/>
+        </p:spPr>
+        <p:txBody>
+          <a:bodyPr wrap="square" rtlCol="0">
+            <a:spAutoFit/>
+          </a:bodyPr>
+          <a:lstStyle/>
+          <a:p>
+            <a:pPr marL="342900" indent="-342900">
+              <a:buAutoNum type="arabicPeriod"/>
+            </a:pPr>
             <a:r>
               <a:rPr lang="en-US" sz="2500" dirty="0">
                 <a:solidFill>
                   <a:srgbClr val="002060"/>
                 </a:solidFill>
               </a:rPr>
-              <a:t>Summary</a:t>
-            </a:r>
-          </a:p>
-        </p:txBody>
-      </p:sp>
-      <p:sp>
-        <p:nvSpPr>
-          <p:cNvPr id="12" name="TextBox 11">
-            <a:extLst>
-              <a:ext uri="{FF2B5EF4-FFF2-40B4-BE49-F238E27FC236}">
-                <a16:creationId xmlns:a16="http://schemas.microsoft.com/office/drawing/2014/main" id="{FE45BE8C-4EAB-8247-9F1F-C30647B240AF}"/>
+              <a:t>Sparrow connects disaster victims and first responders to doctors around the world.</a:t>
+            </a:r>
+          </a:p>
+        </p:txBody>
+      </p:sp>
+      <p:sp>
+        <p:nvSpPr>
+          <p:cNvPr id="11" name="TextBox 10">
+            <a:extLst>
+              <a:ext uri="{FF2B5EF4-FFF2-40B4-BE49-F238E27FC236}">
+                <a16:creationId xmlns:a16="http://schemas.microsoft.com/office/drawing/2014/main" id="{42641433-4E32-D644-8545-380B3FCE95BC}"/>
               </a:ext>
             </a:extLst>
           </p:cNvPr>
@@ -4015,8 +4052,8 @@
         </p:nvSpPr>
         <p:spPr>
           <a:xfrm>
-            <a:off x="1248368" y="1490169"/>
-            <a:ext cx="9337455" cy="3970318"/>
+            <a:off x="1313750" y="3179718"/>
+            <a:ext cx="9564499" cy="477054"/>
           </a:xfrm>
           <a:prstGeom prst="rect">
             <a:avLst/>
@@ -4030,44 +4067,156 @@
           <a:lstStyle/>
           <a:p>
             <a:r>
+              <a:rPr lang="en-US" sz="2500" dirty="0">
+                <a:solidFill>
+                  <a:srgbClr val="002060"/>
+                </a:solidFill>
+              </a:rPr>
+              <a:t>2. Sparrow ensures Information and Applications are always accessible </a:t>
+            </a:r>
+          </a:p>
+        </p:txBody>
+      </p:sp>
+      <p:sp>
+        <p:nvSpPr>
+          <p:cNvPr id="12" name="TextBox 11">
+            <a:extLst>
+              <a:ext uri="{FF2B5EF4-FFF2-40B4-BE49-F238E27FC236}">
+                <a16:creationId xmlns:a16="http://schemas.microsoft.com/office/drawing/2014/main" id="{FE45BE8C-4EAB-8247-9F1F-C30647B240AF}"/>
+              </a:ext>
+            </a:extLst>
+          </p:cNvPr>
+          <p:cNvSpPr txBox="1"/>
+          <p:nvPr/>
+        </p:nvSpPr>
+        <p:spPr>
+          <a:xfrm>
+            <a:off x="1654004" y="2513618"/>
+            <a:ext cx="9337455" cy="646331"/>
+          </a:xfrm>
+          <a:prstGeom prst="rect">
+            <a:avLst/>
+          </a:prstGeom>
+          <a:noFill/>
+        </p:spPr>
+        <p:txBody>
+          <a:bodyPr wrap="square" rtlCol="0">
+            <a:spAutoFit/>
+          </a:bodyPr>
+          <a:lstStyle/>
+          <a:p>
+            <a:r>
               <a:rPr lang="en-US" dirty="0"/>
-              <a:t>Sparrow platform is an open-source AI enabled ecosystem for medical and psychological preparedness, well being, and recovery.</a:t>
-            </a:r>
-          </a:p>
-          <a:p>
-            <a:endParaRPr lang="en-US" dirty="0"/>
-          </a:p>
+              <a:t>Imagine Uber like system where doctors / medical experts can signup and get connected directly with those in need of medical help. Same is true for connecting with 911 or 100!</a:t>
+            </a:r>
+          </a:p>
+        </p:txBody>
+      </p:sp>
+      <p:sp>
+        <p:nvSpPr>
+          <p:cNvPr id="13" name="TextBox 12">
+            <a:extLst>
+              <a:ext uri="{FF2B5EF4-FFF2-40B4-BE49-F238E27FC236}">
+                <a16:creationId xmlns:a16="http://schemas.microsoft.com/office/drawing/2014/main" id="{39626595-E10D-3643-86BD-FB295FAE0A25}"/>
+              </a:ext>
+            </a:extLst>
+          </p:cNvPr>
+          <p:cNvSpPr txBox="1"/>
+          <p:nvPr/>
+        </p:nvSpPr>
+        <p:spPr>
+          <a:xfrm>
+            <a:off x="1654004" y="3676541"/>
+            <a:ext cx="9337455" cy="646331"/>
+          </a:xfrm>
+          <a:prstGeom prst="rect">
+            <a:avLst/>
+          </a:prstGeom>
+          <a:noFill/>
+        </p:spPr>
+        <p:txBody>
+          <a:bodyPr wrap="square" rtlCol="0">
+            <a:spAutoFit/>
+          </a:bodyPr>
+          <a:lstStyle/>
           <a:p>
             <a:r>
               <a:rPr lang="en-US" dirty="0"/>
-              <a:t>What sparrow does comes in 2 parts -</a:t>
-            </a:r>
-          </a:p>
+              <a:t>Like Alexa / Google assistant, but way better. Ask questions to get data from all applications out there.</a:t>
+            </a:r>
+          </a:p>
+        </p:txBody>
+      </p:sp>
+      <p:sp>
+        <p:nvSpPr>
+          <p:cNvPr id="14" name="TextBox 13">
+            <a:extLst>
+              <a:ext uri="{FF2B5EF4-FFF2-40B4-BE49-F238E27FC236}">
+                <a16:creationId xmlns:a16="http://schemas.microsoft.com/office/drawing/2014/main" id="{4C4FA7A0-1C92-024B-84B7-F8CC74B5DABB}"/>
+              </a:ext>
+            </a:extLst>
+          </p:cNvPr>
+          <p:cNvSpPr txBox="1"/>
+          <p:nvPr/>
+        </p:nvSpPr>
+        <p:spPr>
+          <a:xfrm>
+            <a:off x="1313750" y="4342641"/>
+            <a:ext cx="9808137" cy="477054"/>
+          </a:xfrm>
+          <a:prstGeom prst="rect">
+            <a:avLst/>
+          </a:prstGeom>
+          <a:noFill/>
+        </p:spPr>
+        <p:txBody>
+          <a:bodyPr wrap="square" rtlCol="0">
+            <a:spAutoFit/>
+          </a:bodyPr>
+          <a:lstStyle/>
+          <a:p>
+            <a:r>
+              <a:rPr lang="en-US" sz="2500" dirty="0">
+                <a:solidFill>
+                  <a:srgbClr val="002060"/>
+                </a:solidFill>
+              </a:rPr>
+              <a:t>3. Sparrow acts as a companion who is a medical and psychological expert</a:t>
+            </a:r>
+          </a:p>
+        </p:txBody>
+      </p:sp>
+      <p:sp>
+        <p:nvSpPr>
+          <p:cNvPr id="15" name="TextBox 14">
+            <a:extLst>
+              <a:ext uri="{FF2B5EF4-FFF2-40B4-BE49-F238E27FC236}">
+                <a16:creationId xmlns:a16="http://schemas.microsoft.com/office/drawing/2014/main" id="{AF9E9A3A-6DEF-FC49-BDB8-16B0101A6A7E}"/>
+              </a:ext>
+            </a:extLst>
+          </p:cNvPr>
+          <p:cNvSpPr txBox="1"/>
+          <p:nvPr/>
+        </p:nvSpPr>
+        <p:spPr>
+          <a:xfrm>
+            <a:off x="1654004" y="4839463"/>
+            <a:ext cx="9337455" cy="369332"/>
+          </a:xfrm>
+          <a:prstGeom prst="rect">
+            <a:avLst/>
+          </a:prstGeom>
+          <a:noFill/>
+        </p:spPr>
+        <p:txBody>
+          <a:bodyPr wrap="square" rtlCol="0">
+            <a:spAutoFit/>
+          </a:bodyPr>
+          <a:lstStyle/>
           <a:p>
             <a:r>
               <a:rPr lang="en-US" dirty="0"/>
-              <a:t>First it connects disaster victims directly to medical experts and first responders across the world.</a:t>
-            </a:r>
-          </a:p>
-          <a:p>
-            <a:r>
-              <a:rPr lang="en-US" dirty="0"/>
-              <a:t>Secondly it brings disaster management applications, information sources, alerts/updates, medical AI, CBT bots, emergency services like 911, 100, or all these siloed systems and apps into one place through a conversational interface.</a:t>
-            </a:r>
-          </a:p>
-          <a:p>
-            <a:endParaRPr lang="en-US" dirty="0"/>
-          </a:p>
-          <a:p>
-            <a:r>
-              <a:rPr lang="en-US" dirty="0"/>
-              <a:t>The way sparrow achieves this is the key innovation - Sparrow is a conversational AI like Alexa, accessible through any existing apps / services like SMS, voice calls, chat apps like WhatsApp, messenger, etc.</a:t>
-            </a:r>
-          </a:p>
-          <a:p>
-            <a:r>
-              <a:rPr lang="en-US" dirty="0"/>
-              <a:t>Sparrow leverages IoT and edge computing to create mesh networks, ensuring all sparrow features are accessible even without traditional networks.</a:t>
+              <a:t>AI Trained over decades of rich medical data to delivery help and ensure follow-ups</a:t>
             </a:r>
           </a:p>
         </p:txBody>
@@ -4075,7 +4224,7 @@
     </p:spTree>
     <p:extLst>
       <p:ext uri="{BB962C8B-B14F-4D97-AF65-F5344CB8AC3E}">
-        <p14:creationId xmlns:p14="http://schemas.microsoft.com/office/powerpoint/2010/main" val="3710863136"/>
+        <p14:creationId xmlns:p14="http://schemas.microsoft.com/office/powerpoint/2010/main" val="1019139496"/>
       </p:ext>
     </p:extLst>
   </p:cSld>
@@ -4223,7 +4372,7 @@
         <p:spPr>
           <a:xfrm>
             <a:off x="904447" y="1120837"/>
-            <a:ext cx="2489464" cy="369332"/>
+            <a:ext cx="3094117" cy="369332"/>
           </a:xfrm>
           <a:prstGeom prst="rect">
             <a:avLst/>
@@ -4238,7 +4387,7 @@
           <a:p>
             <a:r>
               <a:rPr lang="en-US" dirty="0"/>
-              <a:t>What does Sparrow do? </a:t>
+              <a:t>What’s unique about Sparrow?</a:t>
             </a:r>
           </a:p>
         </p:txBody>
@@ -4258,7 +4407,7 @@
         <p:spPr>
           <a:xfrm>
             <a:off x="1313750" y="1632075"/>
-            <a:ext cx="9564499" cy="861774"/>
+            <a:ext cx="9564499" cy="477054"/>
           </a:xfrm>
           <a:prstGeom prst="rect">
             <a:avLst/>
@@ -4280,17 +4429,17 @@
                   <a:srgbClr val="002060"/>
                 </a:solidFill>
               </a:rPr>
-              <a:t>Sparrow connects disaster victims and first responders to doctors around the world.</a:t>
-            </a:r>
-          </a:p>
-        </p:txBody>
-      </p:sp>
-      <p:sp>
-        <p:nvSpPr>
-          <p:cNvPr id="11" name="TextBox 10">
-            <a:extLst>
-              <a:ext uri="{FF2B5EF4-FFF2-40B4-BE49-F238E27FC236}">
-                <a16:creationId xmlns:a16="http://schemas.microsoft.com/office/drawing/2014/main" id="{42641433-4E32-D644-8545-380B3FCE95BC}"/>
+              <a:t>No need to install new applications</a:t>
+            </a:r>
+          </a:p>
+        </p:txBody>
+      </p:sp>
+      <p:sp>
+        <p:nvSpPr>
+          <p:cNvPr id="12" name="TextBox 11">
+            <a:extLst>
+              <a:ext uri="{FF2B5EF4-FFF2-40B4-BE49-F238E27FC236}">
+                <a16:creationId xmlns:a16="http://schemas.microsoft.com/office/drawing/2014/main" id="{FE45BE8C-4EAB-8247-9F1F-C30647B240AF}"/>
               </a:ext>
             </a:extLst>
           </p:cNvPr>
@@ -4299,7 +4448,42 @@
         </p:nvSpPr>
         <p:spPr>
           <a:xfrm>
-            <a:off x="1313750" y="3151090"/>
+            <a:off x="1654003" y="2128274"/>
+            <a:ext cx="9337455" cy="646331"/>
+          </a:xfrm>
+          <a:prstGeom prst="rect">
+            <a:avLst/>
+          </a:prstGeom>
+          <a:noFill/>
+        </p:spPr>
+        <p:txBody>
+          <a:bodyPr wrap="square" rtlCol="0">
+            <a:spAutoFit/>
+          </a:bodyPr>
+          <a:lstStyle/>
+          <a:p>
+            <a:r>
+              <a:rPr lang="en-US" dirty="0"/>
+              <a:t>Sparrow is accessible through any applications users already have – WhatsApp, Messenger, WeChat, Viber, Telegram (and so on).</a:t>
+            </a:r>
+          </a:p>
+        </p:txBody>
+      </p:sp>
+      <p:sp>
+        <p:nvSpPr>
+          <p:cNvPr id="14" name="TextBox 13">
+            <a:extLst>
+              <a:ext uri="{FF2B5EF4-FFF2-40B4-BE49-F238E27FC236}">
+                <a16:creationId xmlns:a16="http://schemas.microsoft.com/office/drawing/2014/main" id="{8EE3E69F-15EF-7449-9E6D-47ABF9F1AAD3}"/>
+              </a:ext>
+            </a:extLst>
+          </p:cNvPr>
+          <p:cNvSpPr txBox="1"/>
+          <p:nvPr/>
+        </p:nvSpPr>
+        <p:spPr>
+          <a:xfrm>
+            <a:off x="1313750" y="2793750"/>
             <a:ext cx="9564499" cy="477054"/>
           </a:xfrm>
           <a:prstGeom prst="rect">
@@ -4319,17 +4503,17 @@
                   <a:srgbClr val="002060"/>
                 </a:solidFill>
               </a:rPr>
-              <a:t>2. Sparrow ensures Information and Applications are always accessible </a:t>
-            </a:r>
-          </a:p>
-        </p:txBody>
-      </p:sp>
-      <p:sp>
-        <p:nvSpPr>
-          <p:cNvPr id="12" name="TextBox 11">
-            <a:extLst>
-              <a:ext uri="{FF2B5EF4-FFF2-40B4-BE49-F238E27FC236}">
-                <a16:creationId xmlns:a16="http://schemas.microsoft.com/office/drawing/2014/main" id="{FE45BE8C-4EAB-8247-9F1F-C30647B240AF}"/>
+              <a:t>2. No network? No worries!</a:t>
+            </a:r>
+          </a:p>
+        </p:txBody>
+      </p:sp>
+      <p:sp>
+        <p:nvSpPr>
+          <p:cNvPr id="15" name="TextBox 14">
+            <a:extLst>
+              <a:ext uri="{FF2B5EF4-FFF2-40B4-BE49-F238E27FC236}">
+                <a16:creationId xmlns:a16="http://schemas.microsoft.com/office/drawing/2014/main" id="{26AA0D34-F2B7-9744-A171-E677620A1CC8}"/>
               </a:ext>
             </a:extLst>
           </p:cNvPr>
@@ -4338,7 +4522,7 @@
         </p:nvSpPr>
         <p:spPr>
           <a:xfrm>
-            <a:off x="1654004" y="2496282"/>
+            <a:off x="1654003" y="3289949"/>
             <a:ext cx="9337455" cy="646331"/>
           </a:xfrm>
           <a:prstGeom prst="rect">
@@ -4354,17 +4538,17 @@
           <a:p>
             <a:r>
               <a:rPr lang="en-US" dirty="0"/>
-              <a:t>Imagine Uber like system where doctors / medical experts can signup and get connected directly with those in need of medical help</a:t>
-            </a:r>
-          </a:p>
-        </p:txBody>
-      </p:sp>
-      <p:sp>
-        <p:nvSpPr>
-          <p:cNvPr id="13" name="TextBox 12">
-            <a:extLst>
-              <a:ext uri="{FF2B5EF4-FFF2-40B4-BE49-F238E27FC236}">
-                <a16:creationId xmlns:a16="http://schemas.microsoft.com/office/drawing/2014/main" id="{39626595-E10D-3643-86BD-FB295FAE0A25}"/>
+              <a:t>Sparrow can be accessed without internet through SMS and voice calls. Sparrow works even when you are out of network coverage, or when network is down.</a:t>
+            </a:r>
+          </a:p>
+        </p:txBody>
+      </p:sp>
+      <p:sp>
+        <p:nvSpPr>
+          <p:cNvPr id="16" name="TextBox 15">
+            <a:extLst>
+              <a:ext uri="{FF2B5EF4-FFF2-40B4-BE49-F238E27FC236}">
+                <a16:creationId xmlns:a16="http://schemas.microsoft.com/office/drawing/2014/main" id="{C109B634-FEAD-514A-B433-7B37EB5BA3A1}"/>
               </a:ext>
             </a:extLst>
           </p:cNvPr>
@@ -4373,8 +4557,8 @@
         </p:nvSpPr>
         <p:spPr>
           <a:xfrm>
-            <a:off x="1654004" y="3709265"/>
-            <a:ext cx="9337455" cy="369332"/>
+            <a:off x="1313750" y="3955425"/>
+            <a:ext cx="10022945" cy="477054"/>
           </a:xfrm>
           <a:prstGeom prst="rect">
             <a:avLst/>
@@ -4388,8 +4572,61 @@
           <a:lstStyle/>
           <a:p>
             <a:r>
+              <a:rPr lang="en-US" sz="2500" dirty="0">
+                <a:solidFill>
+                  <a:srgbClr val="002060"/>
+                </a:solidFill>
+              </a:rPr>
+              <a:t>3. All applications and platforms accessible through chat app of your choice</a:t>
+            </a:r>
+          </a:p>
+        </p:txBody>
+      </p:sp>
+      <p:sp>
+        <p:nvSpPr>
+          <p:cNvPr id="18" name="TextBox 17">
+            <a:extLst>
+              <a:ext uri="{FF2B5EF4-FFF2-40B4-BE49-F238E27FC236}">
+                <a16:creationId xmlns:a16="http://schemas.microsoft.com/office/drawing/2014/main" id="{DC79ABE7-7772-B34C-82AF-43FD1F52F7E1}"/>
+              </a:ext>
+            </a:extLst>
+          </p:cNvPr>
+          <p:cNvSpPr txBox="1"/>
+          <p:nvPr/>
+        </p:nvSpPr>
+        <p:spPr>
+          <a:xfrm>
+            <a:off x="1654003" y="4451624"/>
+            <a:ext cx="9337455" cy="1200329"/>
+          </a:xfrm>
+          <a:prstGeom prst="rect">
+            <a:avLst/>
+          </a:prstGeom>
+          <a:noFill/>
+        </p:spPr>
+        <p:txBody>
+          <a:bodyPr wrap="square" rtlCol="0">
+            <a:spAutoFit/>
+          </a:bodyPr>
+          <a:lstStyle/>
+          <a:p>
+            <a:r>
               <a:rPr lang="en-US" dirty="0"/>
-              <a:t>Like Alexa / Google assistant, but way better </a:t>
+              <a:t>Alexa makes </a:t>
+            </a:r>
+            <a:r>
+              <a:rPr lang="en-US" dirty="0" err="1"/>
+              <a:t>alexa</a:t>
+            </a:r>
+            <a:r>
+              <a:rPr lang="en-US" dirty="0"/>
+              <a:t> skills accessible through Echo devices. Sparrow makes Sparrow Applets accessible through world’s any chat app, SMS, Voice calls, etc. </a:t>
+            </a:r>
+          </a:p>
+          <a:p>
+            <a:r>
+              <a:rPr lang="en-US" dirty="0"/>
+              <a:t>And as we said before, Sparrow features (and thus Sparrow Applets) are accessible even without internet.</a:t>
             </a:r>
           </a:p>
         </p:txBody>
@@ -4397,7 +4634,7 @@
     </p:spTree>
     <p:extLst>
       <p:ext uri="{BB962C8B-B14F-4D97-AF65-F5344CB8AC3E}">
-        <p14:creationId xmlns:p14="http://schemas.microsoft.com/office/powerpoint/2010/main" val="1019139496"/>
+        <p14:creationId xmlns:p14="http://schemas.microsoft.com/office/powerpoint/2010/main" val="3214469079"/>
       </p:ext>
     </p:extLst>
   </p:cSld>
@@ -4545,427 +4782,6 @@
         <p:spPr>
           <a:xfrm>
             <a:off x="904447" y="1120837"/>
-            <a:ext cx="3094117" cy="369332"/>
-          </a:xfrm>
-          <a:prstGeom prst="rect">
-            <a:avLst/>
-          </a:prstGeom>
-          <a:noFill/>
-        </p:spPr>
-        <p:txBody>
-          <a:bodyPr wrap="none" rtlCol="0">
-            <a:spAutoFit/>
-          </a:bodyPr>
-          <a:lstStyle/>
-          <a:p>
-            <a:r>
-              <a:rPr lang="en-US" dirty="0"/>
-              <a:t>What’s unique about Sparrow?</a:t>
-            </a:r>
-          </a:p>
-        </p:txBody>
-      </p:sp>
-      <p:sp>
-        <p:nvSpPr>
-          <p:cNvPr id="10" name="TextBox 9">
-            <a:extLst>
-              <a:ext uri="{FF2B5EF4-FFF2-40B4-BE49-F238E27FC236}">
-                <a16:creationId xmlns:a16="http://schemas.microsoft.com/office/drawing/2014/main" id="{02047DF3-0242-CE4D-A7F8-B2C12963E959}"/>
-              </a:ext>
-            </a:extLst>
-          </p:cNvPr>
-          <p:cNvSpPr txBox="1"/>
-          <p:nvPr/>
-        </p:nvSpPr>
-        <p:spPr>
-          <a:xfrm>
-            <a:off x="1313750" y="1632075"/>
-            <a:ext cx="9564499" cy="477054"/>
-          </a:xfrm>
-          <a:prstGeom prst="rect">
-            <a:avLst/>
-          </a:prstGeom>
-          <a:noFill/>
-        </p:spPr>
-        <p:txBody>
-          <a:bodyPr wrap="square" rtlCol="0">
-            <a:spAutoFit/>
-          </a:bodyPr>
-          <a:lstStyle/>
-          <a:p>
-            <a:pPr marL="342900" indent="-342900">
-              <a:buAutoNum type="arabicPeriod"/>
-            </a:pPr>
-            <a:r>
-              <a:rPr lang="en-US" sz="2500" dirty="0">
-                <a:solidFill>
-                  <a:srgbClr val="002060"/>
-                </a:solidFill>
-              </a:rPr>
-              <a:t>No need to install new applications</a:t>
-            </a:r>
-          </a:p>
-        </p:txBody>
-      </p:sp>
-      <p:sp>
-        <p:nvSpPr>
-          <p:cNvPr id="12" name="TextBox 11">
-            <a:extLst>
-              <a:ext uri="{FF2B5EF4-FFF2-40B4-BE49-F238E27FC236}">
-                <a16:creationId xmlns:a16="http://schemas.microsoft.com/office/drawing/2014/main" id="{FE45BE8C-4EAB-8247-9F1F-C30647B240AF}"/>
-              </a:ext>
-            </a:extLst>
-          </p:cNvPr>
-          <p:cNvSpPr txBox="1"/>
-          <p:nvPr/>
-        </p:nvSpPr>
-        <p:spPr>
-          <a:xfrm>
-            <a:off x="1654003" y="2109129"/>
-            <a:ext cx="9337455" cy="646331"/>
-          </a:xfrm>
-          <a:prstGeom prst="rect">
-            <a:avLst/>
-          </a:prstGeom>
-          <a:noFill/>
-        </p:spPr>
-        <p:txBody>
-          <a:bodyPr wrap="square" rtlCol="0">
-            <a:spAutoFit/>
-          </a:bodyPr>
-          <a:lstStyle/>
-          <a:p>
-            <a:r>
-              <a:rPr lang="en-US" dirty="0"/>
-              <a:t>Sparrow is accessible through any applications users already have – </a:t>
-            </a:r>
-            <a:r>
-              <a:rPr lang="en-US" dirty="0" err="1"/>
-              <a:t>Whatsapp</a:t>
-            </a:r>
-            <a:r>
-              <a:rPr lang="en-US" dirty="0"/>
-              <a:t>, Messenger, WeChat, Viber, Telegram (and so on)..</a:t>
-            </a:r>
-          </a:p>
-        </p:txBody>
-      </p:sp>
-      <p:sp>
-        <p:nvSpPr>
-          <p:cNvPr id="14" name="TextBox 13">
-            <a:extLst>
-              <a:ext uri="{FF2B5EF4-FFF2-40B4-BE49-F238E27FC236}">
-                <a16:creationId xmlns:a16="http://schemas.microsoft.com/office/drawing/2014/main" id="{8EE3E69F-15EF-7449-9E6D-47ABF9F1AAD3}"/>
-              </a:ext>
-            </a:extLst>
-          </p:cNvPr>
-          <p:cNvSpPr txBox="1"/>
-          <p:nvPr/>
-        </p:nvSpPr>
-        <p:spPr>
-          <a:xfrm>
-            <a:off x="1313750" y="2788026"/>
-            <a:ext cx="9564499" cy="477054"/>
-          </a:xfrm>
-          <a:prstGeom prst="rect">
-            <a:avLst/>
-          </a:prstGeom>
-          <a:noFill/>
-        </p:spPr>
-        <p:txBody>
-          <a:bodyPr wrap="square" rtlCol="0">
-            <a:spAutoFit/>
-          </a:bodyPr>
-          <a:lstStyle/>
-          <a:p>
-            <a:r>
-              <a:rPr lang="en-US" sz="2500" dirty="0">
-                <a:solidFill>
-                  <a:srgbClr val="002060"/>
-                </a:solidFill>
-              </a:rPr>
-              <a:t>2. No network? No worries!</a:t>
-            </a:r>
-          </a:p>
-        </p:txBody>
-      </p:sp>
-      <p:sp>
-        <p:nvSpPr>
-          <p:cNvPr id="15" name="TextBox 14">
-            <a:extLst>
-              <a:ext uri="{FF2B5EF4-FFF2-40B4-BE49-F238E27FC236}">
-                <a16:creationId xmlns:a16="http://schemas.microsoft.com/office/drawing/2014/main" id="{26AA0D34-F2B7-9744-A171-E677620A1CC8}"/>
-              </a:ext>
-            </a:extLst>
-          </p:cNvPr>
-          <p:cNvSpPr txBox="1"/>
-          <p:nvPr/>
-        </p:nvSpPr>
-        <p:spPr>
-          <a:xfrm>
-            <a:off x="1654003" y="3224632"/>
-            <a:ext cx="9337455" cy="923330"/>
-          </a:xfrm>
-          <a:prstGeom prst="rect">
-            <a:avLst/>
-          </a:prstGeom>
-          <a:noFill/>
-        </p:spPr>
-        <p:txBody>
-          <a:bodyPr wrap="square" rtlCol="0">
-            <a:spAutoFit/>
-          </a:bodyPr>
-          <a:lstStyle/>
-          <a:p>
-            <a:r>
-              <a:rPr lang="en-US" dirty="0"/>
-              <a:t>Sparrow can be accessed without internet through SMS and voice calls. Sparrow works even when you are out of network coverage, or when network is down</a:t>
-            </a:r>
-          </a:p>
-          <a:p>
-            <a:endParaRPr lang="en-US" dirty="0"/>
-          </a:p>
-        </p:txBody>
-      </p:sp>
-      <p:sp>
-        <p:nvSpPr>
-          <p:cNvPr id="16" name="TextBox 15">
-            <a:extLst>
-              <a:ext uri="{FF2B5EF4-FFF2-40B4-BE49-F238E27FC236}">
-                <a16:creationId xmlns:a16="http://schemas.microsoft.com/office/drawing/2014/main" id="{C109B634-FEAD-514A-B433-7B37EB5BA3A1}"/>
-              </a:ext>
-            </a:extLst>
-          </p:cNvPr>
-          <p:cNvSpPr txBox="1"/>
-          <p:nvPr/>
-        </p:nvSpPr>
-        <p:spPr>
-          <a:xfrm>
-            <a:off x="1313750" y="3942004"/>
-            <a:ext cx="10022945" cy="477054"/>
-          </a:xfrm>
-          <a:prstGeom prst="rect">
-            <a:avLst/>
-          </a:prstGeom>
-          <a:noFill/>
-        </p:spPr>
-        <p:txBody>
-          <a:bodyPr wrap="square" rtlCol="0">
-            <a:spAutoFit/>
-          </a:bodyPr>
-          <a:lstStyle/>
-          <a:p>
-            <a:r>
-              <a:rPr lang="en-US" sz="2500" dirty="0">
-                <a:solidFill>
-                  <a:srgbClr val="002060"/>
-                </a:solidFill>
-              </a:rPr>
-              <a:t>3. All applications and platforms accessible through chat app of your choice</a:t>
-            </a:r>
-          </a:p>
-        </p:txBody>
-      </p:sp>
-      <p:sp>
-        <p:nvSpPr>
-          <p:cNvPr id="18" name="TextBox 17">
-            <a:extLst>
-              <a:ext uri="{FF2B5EF4-FFF2-40B4-BE49-F238E27FC236}">
-                <a16:creationId xmlns:a16="http://schemas.microsoft.com/office/drawing/2014/main" id="{DC79ABE7-7772-B34C-82AF-43FD1F52F7E1}"/>
-              </a:ext>
-            </a:extLst>
-          </p:cNvPr>
-          <p:cNvSpPr txBox="1"/>
-          <p:nvPr/>
-        </p:nvSpPr>
-        <p:spPr>
-          <a:xfrm>
-            <a:off x="1654003" y="4451624"/>
-            <a:ext cx="9337455" cy="1200329"/>
-          </a:xfrm>
-          <a:prstGeom prst="rect">
-            <a:avLst/>
-          </a:prstGeom>
-          <a:noFill/>
-        </p:spPr>
-        <p:txBody>
-          <a:bodyPr wrap="square" rtlCol="0">
-            <a:spAutoFit/>
-          </a:bodyPr>
-          <a:lstStyle/>
-          <a:p>
-            <a:r>
-              <a:rPr lang="en-US" dirty="0"/>
-              <a:t>Alexa makes </a:t>
-            </a:r>
-            <a:r>
-              <a:rPr lang="en-US" dirty="0" err="1"/>
-              <a:t>alexa</a:t>
-            </a:r>
-            <a:r>
-              <a:rPr lang="en-US" dirty="0"/>
-              <a:t> skills accessible through Echo devices. Sparrow makes Sparrow Applets accessible through world’s any chat app, SMS, Voice calls, etc. </a:t>
-            </a:r>
-          </a:p>
-          <a:p>
-            <a:r>
-              <a:rPr lang="en-US" dirty="0"/>
-              <a:t>And as we said before, Sparrow features (and thus Sparrow Applets) are accessible even without internet.</a:t>
-            </a:r>
-          </a:p>
-        </p:txBody>
-      </p:sp>
-    </p:spTree>
-    <p:extLst>
-      <p:ext uri="{BB962C8B-B14F-4D97-AF65-F5344CB8AC3E}">
-        <p14:creationId xmlns:p14="http://schemas.microsoft.com/office/powerpoint/2010/main" val="3214469079"/>
-      </p:ext>
-    </p:extLst>
-  </p:cSld>
-  <p:clrMapOvr>
-    <a:masterClrMapping/>
-  </p:clrMapOvr>
-</p:sld>
-</file>
-
-<file path=ppt/slides/slide5.xml><?xml version="1.0" encoding="utf-8"?>
-<p:sld xmlns:a="http://schemas.openxmlformats.org/drawingml/2006/main" xmlns:r="http://schemas.openxmlformats.org/officeDocument/2006/relationships" xmlns:p="http://schemas.openxmlformats.org/presentationml/2006/main">
-  <p:cSld>
-    <p:spTree>
-      <p:nvGrpSpPr>
-        <p:cNvPr id="1" name=""/>
-        <p:cNvGrpSpPr/>
-        <p:nvPr/>
-      </p:nvGrpSpPr>
-      <p:grpSpPr>
-        <a:xfrm>
-          <a:off x="0" y="0"/>
-          <a:ext cx="0" cy="0"/>
-          <a:chOff x="0" y="0"/>
-          <a:chExt cx="0" cy="0"/>
-        </a:xfrm>
-      </p:grpSpPr>
-      <p:pic>
-        <p:nvPicPr>
-          <p:cNvPr id="2" name="Object 1"/>
-          <p:cNvPicPr>
-            <a:picLocks noChangeAspect="1"/>
-          </p:cNvPicPr>
-          <p:nvPr/>
-        </p:nvPicPr>
-        <p:blipFill>
-          <a:blip r:embed="rId2" cstate="print"/>
-          <a:stretch>
-            <a:fillRect/>
-          </a:stretch>
-        </p:blipFill>
-        <p:spPr>
-          <a:xfrm>
-            <a:off x="0" y="0"/>
-            <a:ext cx="12192000" cy="6858000"/>
-          </a:xfrm>
-          <a:prstGeom prst="rect">
-            <a:avLst/>
-          </a:prstGeom>
-        </p:spPr>
-      </p:pic>
-      <p:pic>
-        <p:nvPicPr>
-          <p:cNvPr id="6" name="Picture 5">
-            <a:extLst>
-              <a:ext uri="{FF2B5EF4-FFF2-40B4-BE49-F238E27FC236}">
-                <a16:creationId xmlns:a16="http://schemas.microsoft.com/office/drawing/2014/main" id="{4C3A19C5-9323-054C-B3A1-2FA4ED32DF60}"/>
-              </a:ext>
-            </a:extLst>
-          </p:cNvPr>
-          <p:cNvPicPr>
-            <a:picLocks noChangeAspect="1"/>
-          </p:cNvPicPr>
-          <p:nvPr/>
-        </p:nvPicPr>
-        <p:blipFill>
-          <a:blip r:embed="rId3"/>
-          <a:stretch>
-            <a:fillRect/>
-          </a:stretch>
-        </p:blipFill>
-        <p:spPr>
-          <a:xfrm>
-            <a:off x="121920" y="5740399"/>
-            <a:ext cx="696685" cy="928914"/>
-          </a:xfrm>
-          <a:prstGeom prst="rect">
-            <a:avLst/>
-          </a:prstGeom>
-        </p:spPr>
-      </p:pic>
-      <p:sp>
-        <p:nvSpPr>
-          <p:cNvPr id="8" name="Rounded Rectangle 7">
-            <a:extLst>
-              <a:ext uri="{FF2B5EF4-FFF2-40B4-BE49-F238E27FC236}">
-                <a16:creationId xmlns:a16="http://schemas.microsoft.com/office/drawing/2014/main" id="{DD7102C4-329F-F24E-8431-8B19B49C435A}"/>
-              </a:ext>
-            </a:extLst>
-          </p:cNvPr>
-          <p:cNvSpPr/>
-          <p:nvPr/>
-        </p:nvSpPr>
-        <p:spPr>
-          <a:xfrm>
-            <a:off x="631371" y="653144"/>
-            <a:ext cx="10929258" cy="5362423"/>
-          </a:xfrm>
-          <a:prstGeom prst="roundRect">
-            <a:avLst/>
-          </a:prstGeom>
-          <a:solidFill>
-            <a:schemeClr val="bg1"/>
-          </a:solidFill>
-          <a:ln>
-            <a:noFill/>
-          </a:ln>
-        </p:spPr>
-        <p:style>
-          <a:lnRef idx="2">
-            <a:schemeClr val="accent1">
-              <a:shade val="50000"/>
-            </a:schemeClr>
-          </a:lnRef>
-          <a:fillRef idx="1">
-            <a:schemeClr val="accent1"/>
-          </a:fillRef>
-          <a:effectRef idx="0">
-            <a:schemeClr val="accent1"/>
-          </a:effectRef>
-          <a:fontRef idx="minor">
-            <a:schemeClr val="lt1"/>
-          </a:fontRef>
-        </p:style>
-        <p:txBody>
-          <a:bodyPr rtlCol="0" anchor="ctr"/>
-          <a:lstStyle/>
-          <a:p>
-            <a:pPr algn="ctr"/>
-            <a:endParaRPr lang="en-US" dirty="0"/>
-          </a:p>
-        </p:txBody>
-      </p:sp>
-      <p:sp>
-        <p:nvSpPr>
-          <p:cNvPr id="9" name="TextBox 8">
-            <a:extLst>
-              <a:ext uri="{FF2B5EF4-FFF2-40B4-BE49-F238E27FC236}">
-                <a16:creationId xmlns:a16="http://schemas.microsoft.com/office/drawing/2014/main" id="{F745062E-0C6C-6245-BD23-BF59C1D26CE8}"/>
-              </a:ext>
-            </a:extLst>
-          </p:cNvPr>
-          <p:cNvSpPr txBox="1"/>
-          <p:nvPr/>
-        </p:nvSpPr>
-        <p:spPr>
-          <a:xfrm>
-            <a:off x="904447" y="1120837"/>
             <a:ext cx="3676840" cy="369332"/>
           </a:xfrm>
           <a:prstGeom prst="rect">
@@ -5042,7 +4858,7 @@
         </p:nvSpPr>
         <p:spPr>
           <a:xfrm>
-            <a:off x="1654004" y="2135666"/>
+            <a:off x="1654004" y="2109379"/>
             <a:ext cx="9855615" cy="923330"/>
           </a:xfrm>
           <a:prstGeom prst="rect">
@@ -5077,7 +4893,7 @@
         </p:nvSpPr>
         <p:spPr>
           <a:xfrm>
-            <a:off x="1313749" y="3037287"/>
+            <a:off x="1313749" y="3032959"/>
             <a:ext cx="9564499" cy="477054"/>
           </a:xfrm>
           <a:prstGeom prst="rect">
@@ -5116,7 +4932,7 @@
         </p:nvSpPr>
         <p:spPr>
           <a:xfrm>
-            <a:off x="1654003" y="3514341"/>
+            <a:off x="1654003" y="3510263"/>
             <a:ext cx="9337455" cy="646331"/>
           </a:xfrm>
           <a:prstGeom prst="rect">
@@ -5132,7 +4948,7 @@
           <a:p>
             <a:r>
               <a:rPr lang="en-US" dirty="0"/>
-              <a:t>What if all smartphones start behaving as network towers to make a world wide democratized network? That’s exactly what Sparrow does!</a:t>
+              <a:t>What if all smartphones start behaving as network towers to make a world wide democratized network? That’s exactly what Sparrow does by leveraging IoT and edge computing</a:t>
             </a:r>
           </a:p>
         </p:txBody>
@@ -5151,7 +4967,7 @@
         </p:nvSpPr>
         <p:spPr>
           <a:xfrm>
-            <a:off x="1313749" y="4157095"/>
+            <a:off x="1313749" y="4156844"/>
             <a:ext cx="9564499" cy="477054"/>
           </a:xfrm>
           <a:prstGeom prst="rect">

</xml_diff>